<commit_message>
about to delete something
</commit_message>
<xml_diff>
--- a/Exoplanet_Presentation.pptx
+++ b/Exoplanet_Presentation.pptx
@@ -16,10 +16,11 @@
     <p:sldId id="262" r:id="rId10"/>
     <p:sldId id="263" r:id="rId11"/>
     <p:sldId id="264" r:id="rId12"/>
-    <p:sldId id="265" r:id="rId13"/>
-    <p:sldId id="269" r:id="rId14"/>
-    <p:sldId id="266" r:id="rId15"/>
-    <p:sldId id="267" r:id="rId16"/>
+    <p:sldId id="271" r:id="rId13"/>
+    <p:sldId id="265" r:id="rId14"/>
+    <p:sldId id="269" r:id="rId15"/>
+    <p:sldId id="266" r:id="rId16"/>
+    <p:sldId id="267" r:id="rId17"/>
   </p:sldIdLst>
   <p:sldSz cx="12192000" cy="6858000"/>
   <p:notesSz cx="6858000" cy="9144000"/>
@@ -3830,6 +3831,20 @@
             </a:r>
           </a:p>
           <a:p>
+            <a:r>
+              <a:rPr lang="en-US" dirty="0"/>
+              <a:t>Training and test </a:t>
+            </a:r>
+            <a:r>
+              <a:rPr lang="en-US" dirty="0" err="1"/>
+              <a:t>acc</a:t>
+            </a:r>
+            <a:r>
+              <a:rPr lang="en-US" dirty="0"/>
+              <a:t> plot</a:t>
+            </a:r>
+          </a:p>
+          <a:p>
             <a:endParaRPr lang="en-US" dirty="0"/>
           </a:p>
         </p:txBody>
@@ -3869,7 +3884,7 @@
           <p:cNvPr id="2" name="Title 1">
             <a:extLst>
               <a:ext uri="{FF2B5EF4-FFF2-40B4-BE49-F238E27FC236}">
-                <a16:creationId xmlns:a16="http://schemas.microsoft.com/office/drawing/2014/main" id="{BC764BC2-E09C-9F41-A9D0-0D350037B4F4}"/>
+                <a16:creationId xmlns:a16="http://schemas.microsoft.com/office/drawing/2014/main" id="{75200AC5-BB89-604B-9970-9B65F5BD0234}"/>
               </a:ext>
             </a:extLst>
           </p:cNvPr>
@@ -3887,7 +3902,7 @@
           <a:p>
             <a:r>
               <a:rPr lang="en-US" dirty="0"/>
-              <a:t>Conclusions</a:t>
+              <a:t>What do we know about the planets predicted?</a:t>
             </a:r>
           </a:p>
         </p:txBody>
@@ -3897,7 +3912,7 @@
           <p:cNvPr id="3" name="Content Placeholder 2">
             <a:extLst>
               <a:ext uri="{FF2B5EF4-FFF2-40B4-BE49-F238E27FC236}">
-                <a16:creationId xmlns:a16="http://schemas.microsoft.com/office/drawing/2014/main" id="{5E2453A8-B69B-0B4C-907F-36DFF5F7DD5A}"/>
+                <a16:creationId xmlns:a16="http://schemas.microsoft.com/office/drawing/2014/main" id="{ACF69DB2-8F11-6D41-AF22-93C69422979D}"/>
               </a:ext>
             </a:extLst>
           </p:cNvPr>
@@ -3915,13 +3930,11 @@
           <a:p>
             <a:r>
               <a:rPr lang="en-US" dirty="0"/>
-              <a:t>How many stars in the night sky have transits</a:t>
-            </a:r>
-          </a:p>
-          <a:p>
-            <a:r>
-              <a:rPr lang="en-US" dirty="0"/>
-              <a:t>How did the model perform on the unseen data?</a:t>
+              <a:t>How many are n </a:t>
+            </a:r>
+            <a:r>
+              <a:rPr lang="en-US"/>
+              <a:t>the habitable zone?</a:t>
             </a:r>
           </a:p>
         </p:txBody>
@@ -3929,7 +3942,7 @@
     </p:spTree>
     <p:extLst>
       <p:ext uri="{BB962C8B-B14F-4D97-AF65-F5344CB8AC3E}">
-        <p14:creationId xmlns:p14="http://schemas.microsoft.com/office/powerpoint/2010/main" val="297725543"/>
+        <p14:creationId xmlns:p14="http://schemas.microsoft.com/office/powerpoint/2010/main" val="4243392929"/>
       </p:ext>
     </p:extLst>
   </p:cSld>
@@ -3961,7 +3974,7 @@
           <p:cNvPr id="2" name="Title 1">
             <a:extLst>
               <a:ext uri="{FF2B5EF4-FFF2-40B4-BE49-F238E27FC236}">
-                <a16:creationId xmlns:a16="http://schemas.microsoft.com/office/drawing/2014/main" id="{76775A4F-5D6E-A144-A919-B97A6BC0A3CA}"/>
+                <a16:creationId xmlns:a16="http://schemas.microsoft.com/office/drawing/2014/main" id="{BC764BC2-E09C-9F41-A9D0-0D350037B4F4}"/>
               </a:ext>
             </a:extLst>
           </p:cNvPr>
@@ -3979,7 +3992,7 @@
           <a:p>
             <a:r>
               <a:rPr lang="en-US" dirty="0"/>
-              <a:t>What we really want to know</a:t>
+              <a:t>Conclusions</a:t>
             </a:r>
           </a:p>
         </p:txBody>
@@ -3989,7 +4002,7 @@
           <p:cNvPr id="3" name="Content Placeholder 2">
             <a:extLst>
               <a:ext uri="{FF2B5EF4-FFF2-40B4-BE49-F238E27FC236}">
-                <a16:creationId xmlns:a16="http://schemas.microsoft.com/office/drawing/2014/main" id="{342D75BB-CEAC-6C45-BB0D-B9373DE29465}"/>
+                <a16:creationId xmlns:a16="http://schemas.microsoft.com/office/drawing/2014/main" id="{5E2453A8-B69B-0B4C-907F-36DFF5F7DD5A}"/>
               </a:ext>
             </a:extLst>
           </p:cNvPr>
@@ -4007,30 +4020,21 @@
           <a:p>
             <a:r>
               <a:rPr lang="en-US" dirty="0"/>
-              <a:t>Are there aliens?</a:t>
-            </a:r>
-          </a:p>
-          <a:p>
-            <a:r>
-              <a:rPr lang="en-US" dirty="0"/>
-              <a:t>How many earth</a:t>
-            </a:r>
-          </a:p>
-          <a:p>
-            <a:r>
-              <a:rPr lang="en-US" dirty="0"/>
-              <a:t>Did they make the pyramids?</a:t>
-            </a:r>
-          </a:p>
-          <a:p>
-            <a:endParaRPr lang="en-US" dirty="0"/>
+              <a:t>How many stars in the night sky have transits</a:t>
+            </a:r>
+          </a:p>
+          <a:p>
+            <a:r>
+              <a:rPr lang="en-US" dirty="0"/>
+              <a:t>How did the model perform on the unseen data?</a:t>
+            </a:r>
           </a:p>
         </p:txBody>
       </p:sp>
     </p:spTree>
     <p:extLst>
       <p:ext uri="{BB962C8B-B14F-4D97-AF65-F5344CB8AC3E}">
-        <p14:creationId xmlns:p14="http://schemas.microsoft.com/office/powerpoint/2010/main" val="1618412748"/>
+        <p14:creationId xmlns:p14="http://schemas.microsoft.com/office/powerpoint/2010/main" val="297725543"/>
       </p:ext>
     </p:extLst>
   </p:cSld>
@@ -4062,6 +4066,107 @@
           <p:cNvPr id="2" name="Title 1">
             <a:extLst>
               <a:ext uri="{FF2B5EF4-FFF2-40B4-BE49-F238E27FC236}">
+                <a16:creationId xmlns:a16="http://schemas.microsoft.com/office/drawing/2014/main" id="{76775A4F-5D6E-A144-A919-B97A6BC0A3CA}"/>
+              </a:ext>
+            </a:extLst>
+          </p:cNvPr>
+          <p:cNvSpPr>
+            <a:spLocks noGrp="1"/>
+          </p:cNvSpPr>
+          <p:nvPr>
+            <p:ph type="title"/>
+          </p:nvPr>
+        </p:nvSpPr>
+        <p:spPr/>
+        <p:txBody>
+          <a:bodyPr/>
+          <a:lstStyle/>
+          <a:p>
+            <a:r>
+              <a:rPr lang="en-US" dirty="0"/>
+              <a:t>What we really want to know</a:t>
+            </a:r>
+          </a:p>
+        </p:txBody>
+      </p:sp>
+      <p:sp>
+        <p:nvSpPr>
+          <p:cNvPr id="3" name="Content Placeholder 2">
+            <a:extLst>
+              <a:ext uri="{FF2B5EF4-FFF2-40B4-BE49-F238E27FC236}">
+                <a16:creationId xmlns:a16="http://schemas.microsoft.com/office/drawing/2014/main" id="{342D75BB-CEAC-6C45-BB0D-B9373DE29465}"/>
+              </a:ext>
+            </a:extLst>
+          </p:cNvPr>
+          <p:cNvSpPr>
+            <a:spLocks noGrp="1"/>
+          </p:cNvSpPr>
+          <p:nvPr>
+            <p:ph idx="1"/>
+          </p:nvPr>
+        </p:nvSpPr>
+        <p:spPr/>
+        <p:txBody>
+          <a:bodyPr/>
+          <a:lstStyle/>
+          <a:p>
+            <a:r>
+              <a:rPr lang="en-US" dirty="0"/>
+              <a:t>Are there aliens?</a:t>
+            </a:r>
+          </a:p>
+          <a:p>
+            <a:r>
+              <a:rPr lang="en-US" dirty="0"/>
+              <a:t>How many earth</a:t>
+            </a:r>
+          </a:p>
+          <a:p>
+            <a:r>
+              <a:rPr lang="en-US" dirty="0"/>
+              <a:t>Did they make the pyramids?</a:t>
+            </a:r>
+          </a:p>
+          <a:p>
+            <a:endParaRPr lang="en-US" dirty="0"/>
+          </a:p>
+        </p:txBody>
+      </p:sp>
+    </p:spTree>
+    <p:extLst>
+      <p:ext uri="{BB962C8B-B14F-4D97-AF65-F5344CB8AC3E}">
+        <p14:creationId xmlns:p14="http://schemas.microsoft.com/office/powerpoint/2010/main" val="1618412748"/>
+      </p:ext>
+    </p:extLst>
+  </p:cSld>
+  <p:clrMapOvr>
+    <a:masterClrMapping/>
+  </p:clrMapOvr>
+</p:sld>
+</file>
+
+<file path=ppt/slides/slide15.xml><?xml version="1.0" encoding="utf-8"?>
+<p:sld xmlns:a="http://schemas.openxmlformats.org/drawingml/2006/main" xmlns:r="http://schemas.openxmlformats.org/officeDocument/2006/relationships" xmlns:p="http://schemas.openxmlformats.org/presentationml/2006/main">
+  <p:cSld>
+    <p:spTree>
+      <p:nvGrpSpPr>
+        <p:cNvPr id="1" name=""/>
+        <p:cNvGrpSpPr/>
+        <p:nvPr/>
+      </p:nvGrpSpPr>
+      <p:grpSpPr>
+        <a:xfrm>
+          <a:off x="0" y="0"/>
+          <a:ext cx="0" cy="0"/>
+          <a:chOff x="0" y="0"/>
+          <a:chExt cx="0" cy="0"/>
+        </a:xfrm>
+      </p:grpSpPr>
+      <p:sp>
+        <p:nvSpPr>
+          <p:cNvPr id="2" name="Title 1">
+            <a:extLst>
+              <a:ext uri="{FF2B5EF4-FFF2-40B4-BE49-F238E27FC236}">
                 <a16:creationId xmlns:a16="http://schemas.microsoft.com/office/drawing/2014/main" id="{368AB1EE-CD90-C84A-B778-C55880F67176}"/>
               </a:ext>
             </a:extLst>
@@ -4139,7 +4244,7 @@
 </p:sld>
 </file>
 
-<file path=ppt/slides/slide15.xml><?xml version="1.0" encoding="utf-8"?>
+<file path=ppt/slides/slide16.xml><?xml version="1.0" encoding="utf-8"?>
 <p:sld xmlns:a="http://schemas.openxmlformats.org/drawingml/2006/main" xmlns:r="http://schemas.openxmlformats.org/officeDocument/2006/relationships" xmlns:p="http://schemas.openxmlformats.org/presentationml/2006/main">
   <p:cSld>
     <p:spTree>
@@ -4713,7 +4818,10 @@
           <a:bodyPr/>
           <a:lstStyle/>
           <a:p>
-            <a:endParaRPr lang="en-US"/>
+            <a:r>
+              <a:rPr lang="en-US" dirty="0"/>
+              <a:t>Why is this a difficult problem</a:t>
+            </a:r>
           </a:p>
         </p:txBody>
       </p:sp>
@@ -5008,6 +5116,13 @@
             <a:r>
               <a:rPr lang="en-US" dirty="0"/>
               <a:t>Other weird things in space</a:t>
+            </a:r>
+          </a:p>
+          <a:p>
+            <a:pPr lvl="2"/>
+            <a:r>
+              <a:rPr lang="en-US" dirty="0"/>
+              <a:t>Solar flares</a:t>
             </a:r>
           </a:p>
           <a:p>

</xml_diff>